<commit_message>
actualizacion estructura y presentaciones
</commit_message>
<xml_diff>
--- a/1_Presentaciones/Sesion_1_Practica.pptx
+++ b/1_Presentaciones/Sesion_1_Practica.pptx
@@ -34,6 +34,7 @@
     <p:sldId id="281" r:id="rId28"/>
     <p:sldId id="297" r:id="rId29"/>
     <p:sldId id="298" r:id="rId30"/>
+    <p:sldId id="299" r:id="rId31"/>
   </p:sldIdLst>
   <p:sldSz cx="12192000" cy="6858000"/>
   <p:notesSz cx="6858000" cy="9144000"/>
@@ -170,6 +171,7 @@
             <p14:sldId id="281"/>
             <p14:sldId id="297"/>
             <p14:sldId id="298"/>
+            <p14:sldId id="299"/>
           </p14:sldIdLst>
         </p14:section>
       </p14:sectionLst>
@@ -563,7 +565,7 @@
           <a:p>
             <a:fld id="{4A42529D-B5B1-47E1-A19B-037CCFF42894}" type="datetimeFigureOut">
               <a:rPr lang="en-GB" smtClean="0"/>
-              <a:t>27/10/2021</a:t>
+              <a:t>28/10/2021</a:t>
             </a:fld>
             <a:endParaRPr lang="en-GB"/>
           </a:p>
@@ -749,7 +751,7 @@
           <a:p>
             <a:fld id="{4A42529D-B5B1-47E1-A19B-037CCFF42894}" type="datetimeFigureOut">
               <a:rPr lang="en-GB" smtClean="0"/>
-              <a:t>27/10/2021</a:t>
+              <a:t>28/10/2021</a:t>
             </a:fld>
             <a:endParaRPr lang="en-GB"/>
           </a:p>
@@ -945,7 +947,7 @@
           <a:p>
             <a:fld id="{4A42529D-B5B1-47E1-A19B-037CCFF42894}" type="datetimeFigureOut">
               <a:rPr lang="en-GB" smtClean="0"/>
-              <a:t>27/10/2021</a:t>
+              <a:t>28/10/2021</a:t>
             </a:fld>
             <a:endParaRPr lang="en-GB"/>
           </a:p>
@@ -2290,7 +2292,7 @@
           <a:p>
             <a:fld id="{4A42529D-B5B1-47E1-A19B-037CCFF42894}" type="datetimeFigureOut">
               <a:rPr lang="en-GB" smtClean="0"/>
-              <a:t>27/10/2021</a:t>
+              <a:t>28/10/2021</a:t>
             </a:fld>
             <a:endParaRPr lang="en-GB"/>
           </a:p>
@@ -2583,7 +2585,7 @@
           <a:p>
             <a:fld id="{4A42529D-B5B1-47E1-A19B-037CCFF42894}" type="datetimeFigureOut">
               <a:rPr lang="en-GB" smtClean="0"/>
-              <a:t>27/10/2021</a:t>
+              <a:t>28/10/2021</a:t>
             </a:fld>
             <a:endParaRPr lang="en-GB"/>
           </a:p>
@@ -8123,6 +8125,270 @@
 </p:sld>
 </file>
 
+<file path=ppt/slides/slide30.xml><?xml version="1.0" encoding="utf-8"?>
+<p:sld xmlns:a="http://schemas.openxmlformats.org/drawingml/2006/main" xmlns:r="http://schemas.openxmlformats.org/officeDocument/2006/relationships" xmlns:p="http://schemas.openxmlformats.org/presentationml/2006/main">
+  <p:cSld>
+    <p:spTree>
+      <p:nvGrpSpPr>
+        <p:cNvPr id="1" name=""/>
+        <p:cNvGrpSpPr/>
+        <p:nvPr/>
+      </p:nvGrpSpPr>
+      <p:grpSpPr>
+        <a:xfrm>
+          <a:off x="0" y="0"/>
+          <a:ext cx="0" cy="0"/>
+          <a:chOff x="0" y="0"/>
+          <a:chExt cx="0" cy="0"/>
+        </a:xfrm>
+      </p:grpSpPr>
+      <p:sp>
+        <p:nvSpPr>
+          <p:cNvPr id="2" name="Título 1">
+            <a:extLst>
+              <a:ext uri="{FF2B5EF4-FFF2-40B4-BE49-F238E27FC236}">
+                <a16:creationId xmlns:a16="http://schemas.microsoft.com/office/drawing/2014/main" id="{CA368606-69E6-4C7D-B87F-D05B8E1502DF}"/>
+              </a:ext>
+            </a:extLst>
+          </p:cNvPr>
+          <p:cNvSpPr>
+            <a:spLocks noGrp="1"/>
+          </p:cNvSpPr>
+          <p:nvPr>
+            <p:ph type="title"/>
+          </p:nvPr>
+        </p:nvSpPr>
+        <p:spPr/>
+        <p:txBody>
+          <a:bodyPr/>
+          <a:lstStyle/>
+          <a:p>
+            <a:r>
+              <a:rPr lang="es-ES" dirty="0"/>
+              <a:t>Agradecimientos</a:t>
+            </a:r>
+          </a:p>
+        </p:txBody>
+      </p:sp>
+      <p:sp>
+        <p:nvSpPr>
+          <p:cNvPr id="4" name="Marcador de contenido 3">
+            <a:extLst>
+              <a:ext uri="{FF2B5EF4-FFF2-40B4-BE49-F238E27FC236}">
+                <a16:creationId xmlns:a16="http://schemas.microsoft.com/office/drawing/2014/main" id="{BBF521F6-13F5-44F3-9FCD-FD0A967D72DB}"/>
+              </a:ext>
+            </a:extLst>
+          </p:cNvPr>
+          <p:cNvSpPr>
+            <a:spLocks noGrp="1"/>
+          </p:cNvSpPr>
+          <p:nvPr>
+            <p:ph idx="1"/>
+          </p:nvPr>
+        </p:nvSpPr>
+        <p:spPr/>
+        <p:txBody>
+          <a:bodyPr/>
+          <a:lstStyle/>
+          <a:p>
+            <a:pPr marL="0" indent="0">
+              <a:buNone/>
+            </a:pPr>
+            <a:r>
+              <a:rPr lang="es-ES" dirty="0"/>
+              <a:t>Los datos empleados en esta práctica han sido recopilados en el marco del proyecto h2020 RELaTED</a:t>
+            </a:r>
+          </a:p>
+        </p:txBody>
+      </p:sp>
+      <p:sp>
+        <p:nvSpPr>
+          <p:cNvPr id="6" name="CuadroTexto 5">
+            <a:extLst>
+              <a:ext uri="{FF2B5EF4-FFF2-40B4-BE49-F238E27FC236}">
+                <a16:creationId xmlns:a16="http://schemas.microsoft.com/office/drawing/2014/main" id="{0C1F24FC-2B05-4DA9-B4BF-4138D641FF8A}"/>
+              </a:ext>
+            </a:extLst>
+          </p:cNvPr>
+          <p:cNvSpPr txBox="1"/>
+          <p:nvPr/>
+        </p:nvSpPr>
+        <p:spPr>
+          <a:xfrm>
+            <a:off x="838200" y="4035531"/>
+            <a:ext cx="8646042" cy="1384995"/>
+          </a:xfrm>
+          <a:prstGeom prst="rect">
+            <a:avLst/>
+          </a:prstGeom>
+          <a:noFill/>
+        </p:spPr>
+        <p:txBody>
+          <a:bodyPr wrap="square">
+            <a:spAutoFit/>
+          </a:bodyPr>
+          <a:lstStyle/>
+          <a:p>
+            <a:pPr algn="just"/>
+            <a:r>
+              <a:rPr lang="en-US" sz="2800" dirty="0">
+                <a:effectLst/>
+                <a:latin typeface="Calibri" panose="020F0502020204030204" pitchFamily="34" charset="0"/>
+                <a:ea typeface="Calibri" panose="020F0502020204030204" pitchFamily="34" charset="0"/>
+                <a:cs typeface="Times New Roman" panose="02020603050405020304" pitchFamily="18" charset="0"/>
+              </a:rPr>
+              <a:t>This project has received funding from the European Union’s Horizon 2020 research and innovation </a:t>
+            </a:r>
+            <a:r>
+              <a:rPr lang="en-US" sz="2800" dirty="0" err="1">
+                <a:effectLst/>
+                <a:latin typeface="Calibri" panose="020F0502020204030204" pitchFamily="34" charset="0"/>
+                <a:ea typeface="Calibri" panose="020F0502020204030204" pitchFamily="34" charset="0"/>
+                <a:cs typeface="Times New Roman" panose="02020603050405020304" pitchFamily="18" charset="0"/>
+              </a:rPr>
+              <a:t>programme</a:t>
+            </a:r>
+            <a:r>
+              <a:rPr lang="en-US" sz="2800" dirty="0">
+                <a:effectLst/>
+                <a:latin typeface="Calibri" panose="020F0502020204030204" pitchFamily="34" charset="0"/>
+                <a:ea typeface="Calibri" panose="020F0502020204030204" pitchFamily="34" charset="0"/>
+                <a:cs typeface="Times New Roman" panose="02020603050405020304" pitchFamily="18" charset="0"/>
+              </a:rPr>
+              <a:t> under grant agreement No 768567.</a:t>
+            </a:r>
+            <a:endParaRPr lang="es-ES" sz="2800" dirty="0">
+              <a:effectLst/>
+              <a:latin typeface="Calibri" panose="020F0502020204030204" pitchFamily="34" charset="0"/>
+              <a:ea typeface="Calibri" panose="020F0502020204030204" pitchFamily="34" charset="0"/>
+              <a:cs typeface="Times New Roman" panose="02020603050405020304" pitchFamily="18" charset="0"/>
+            </a:endParaRPr>
+          </a:p>
+        </p:txBody>
+      </p:sp>
+      <p:pic>
+        <p:nvPicPr>
+          <p:cNvPr id="8" name="Imagen 7">
+            <a:extLst>
+              <a:ext uri="{FF2B5EF4-FFF2-40B4-BE49-F238E27FC236}">
+                <a16:creationId xmlns:a16="http://schemas.microsoft.com/office/drawing/2014/main" id="{694E0C1A-4A9A-407A-874E-2BA105EF8D73}"/>
+              </a:ext>
+            </a:extLst>
+          </p:cNvPr>
+          <p:cNvPicPr>
+            <a:picLocks noChangeAspect="1"/>
+          </p:cNvPicPr>
+          <p:nvPr/>
+        </p:nvPicPr>
+        <p:blipFill>
+          <a:blip r:embed="rId2">
+            <a:extLst>
+              <a:ext uri="{28A0092B-C50C-407E-A947-70E740481C1C}">
+                <a14:useLocalDpi xmlns:a14="http://schemas.microsoft.com/office/drawing/2010/main" val="0"/>
+              </a:ext>
+            </a:extLst>
+          </a:blip>
+          <a:stretch>
+            <a:fillRect/>
+          </a:stretch>
+        </p:blipFill>
+        <p:spPr>
+          <a:xfrm>
+            <a:off x="9838082" y="4256096"/>
+            <a:ext cx="1405756" cy="943864"/>
+          </a:xfrm>
+          <a:prstGeom prst="rect">
+            <a:avLst/>
+          </a:prstGeom>
+        </p:spPr>
+      </p:pic>
+      <p:pic>
+        <p:nvPicPr>
+          <p:cNvPr id="10" name="Imagen 9" descr="Logotipo&#10;&#10;Descripción generada automáticamente con confianza media">
+            <a:extLst>
+              <a:ext uri="{FF2B5EF4-FFF2-40B4-BE49-F238E27FC236}">
+                <a16:creationId xmlns:a16="http://schemas.microsoft.com/office/drawing/2014/main" id="{D0234106-D9A8-4B03-BED3-9790CF5DCD0E}"/>
+              </a:ext>
+            </a:extLst>
+          </p:cNvPr>
+          <p:cNvPicPr>
+            <a:picLocks noChangeAspect="1"/>
+          </p:cNvPicPr>
+          <p:nvPr/>
+        </p:nvPicPr>
+        <p:blipFill>
+          <a:blip r:embed="rId3">
+            <a:extLst>
+              <a:ext uri="{28A0092B-C50C-407E-A947-70E740481C1C}">
+                <a14:useLocalDpi xmlns:a14="http://schemas.microsoft.com/office/drawing/2010/main" val="0"/>
+              </a:ext>
+            </a:extLst>
+          </a:blip>
+          <a:stretch>
+            <a:fillRect/>
+          </a:stretch>
+        </p:blipFill>
+        <p:spPr>
+          <a:xfrm>
+            <a:off x="961706" y="2951864"/>
+            <a:ext cx="1428750" cy="571500"/>
+          </a:xfrm>
+          <a:prstGeom prst="rect">
+            <a:avLst/>
+          </a:prstGeom>
+        </p:spPr>
+      </p:pic>
+      <p:sp>
+        <p:nvSpPr>
+          <p:cNvPr id="12" name="CuadroTexto 11">
+            <a:extLst>
+              <a:ext uri="{FF2B5EF4-FFF2-40B4-BE49-F238E27FC236}">
+                <a16:creationId xmlns:a16="http://schemas.microsoft.com/office/drawing/2014/main" id="{F434B731-F935-4C1A-843D-439A08F2C473}"/>
+              </a:ext>
+            </a:extLst>
+          </p:cNvPr>
+          <p:cNvSpPr txBox="1"/>
+          <p:nvPr/>
+        </p:nvSpPr>
+        <p:spPr>
+          <a:xfrm>
+            <a:off x="2513962" y="3154032"/>
+            <a:ext cx="6097772" cy="369332"/>
+          </a:xfrm>
+          <a:prstGeom prst="rect">
+            <a:avLst/>
+          </a:prstGeom>
+          <a:noFill/>
+        </p:spPr>
+        <p:txBody>
+          <a:bodyPr wrap="square">
+            <a:spAutoFit/>
+          </a:bodyPr>
+          <a:lstStyle/>
+          <a:p>
+            <a:r>
+              <a:rPr lang="es-ES" dirty="0">
+                <a:hlinkClick r:id="rId4"/>
+              </a:rPr>
+              <a:t>http://www.relatedproject.eu/</a:t>
+            </a:r>
+            <a:endParaRPr lang="es-ES" dirty="0"/>
+          </a:p>
+        </p:txBody>
+      </p:sp>
+    </p:spTree>
+    <p:extLst>
+      <p:ext uri="{BB962C8B-B14F-4D97-AF65-F5344CB8AC3E}">
+        <p14:creationId xmlns:p14="http://schemas.microsoft.com/office/powerpoint/2010/main" val="162477815"/>
+      </p:ext>
+    </p:extLst>
+  </p:cSld>
+  <p:clrMapOvr>
+    <a:masterClrMapping/>
+  </p:clrMapOvr>
+</p:sld>
+</file>
+
 <file path=ppt/slides/slide4.xml><?xml version="1.0" encoding="utf-8"?>
 <p:sld xmlns:a="http://schemas.openxmlformats.org/drawingml/2006/main" xmlns:r="http://schemas.openxmlformats.org/officeDocument/2006/relationships" xmlns:p="http://schemas.openxmlformats.org/presentationml/2006/main">
   <p:cSld>

</xml_diff>